<commit_message>
Adding the node stuff
</commit_message>
<xml_diff>
--- a/topic01/talk-2/Serial Bus Comms.pptx
+++ b/topic01/talk-2/Serial Bus Comms.pptx
@@ -119,7 +119,16 @@
       </a:defRPr>
     </a:lvl9pPr>
   </p:defaultTextStyle>
+  <p:extLst>
+    <p:ext uri="{EFAFB233-063F-42B5-8137-9DF3F51BA10A}">
+      <p15:sldGuideLst xmlns:p15="http://schemas.microsoft.com/office/powerpoint/2012/main"/>
+    </p:ext>
+  </p:extLst>
 </p:presentation>
+</file>
+
+<file path=ppt/revisionInfo.xml><?xml version="1.0" encoding="utf-8"?>
+<p1510:revInfo xmlns:a="http://schemas.openxmlformats.org/drawingml/2006/main" xmlns:r="http://schemas.openxmlformats.org/officeDocument/2006/relationships" xmlns:p1510="http://schemas.microsoft.com/office/powerpoint/2015/10/main"/>
 </file>
 
 <file path=ppt/notesMasters/notesMaster1.xml><?xml version="1.0" encoding="utf-8"?>
@@ -204,7 +213,7 @@
           <a:p>
             <a:fld id="{229C0D8A-367A-4CB0-AD68-2068604CE614}" type="datetimeFigureOut">
               <a:rPr lang="en-IE" smtClean="0"/>
-              <a:t>13/09/2017</a:t>
+              <a:t>14/09/2017</a:t>
             </a:fld>
             <a:endParaRPr lang="en-IE"/>
           </a:p>
@@ -621,7 +630,7 @@
           <a:p>
             <a:fld id="{65A75098-A21D-4A4F-97CA-F1F36A2C7EEE}" type="datetimeFigureOut">
               <a:rPr lang="en-IE" smtClean="0"/>
-              <a:t>13/09/2017</a:t>
+              <a:t>14/09/2017</a:t>
             </a:fld>
             <a:endParaRPr lang="en-IE"/>
           </a:p>
@@ -821,7 +830,7 @@
           <a:p>
             <a:fld id="{65A75098-A21D-4A4F-97CA-F1F36A2C7EEE}" type="datetimeFigureOut">
               <a:rPr lang="en-IE" smtClean="0"/>
-              <a:t>13/09/2017</a:t>
+              <a:t>14/09/2017</a:t>
             </a:fld>
             <a:endParaRPr lang="en-IE"/>
           </a:p>
@@ -1031,7 +1040,7 @@
           <a:p>
             <a:fld id="{65A75098-A21D-4A4F-97CA-F1F36A2C7EEE}" type="datetimeFigureOut">
               <a:rPr lang="en-IE" smtClean="0"/>
-              <a:t>13/09/2017</a:t>
+              <a:t>14/09/2017</a:t>
             </a:fld>
             <a:endParaRPr lang="en-IE"/>
           </a:p>
@@ -1231,7 +1240,7 @@
           <a:p>
             <a:fld id="{65A75098-A21D-4A4F-97CA-F1F36A2C7EEE}" type="datetimeFigureOut">
               <a:rPr lang="en-IE" smtClean="0"/>
-              <a:t>13/09/2017</a:t>
+              <a:t>14/09/2017</a:t>
             </a:fld>
             <a:endParaRPr lang="en-IE"/>
           </a:p>
@@ -1507,7 +1516,7 @@
           <a:p>
             <a:fld id="{65A75098-A21D-4A4F-97CA-F1F36A2C7EEE}" type="datetimeFigureOut">
               <a:rPr lang="en-IE" smtClean="0"/>
-              <a:t>13/09/2017</a:t>
+              <a:t>14/09/2017</a:t>
             </a:fld>
             <a:endParaRPr lang="en-IE"/>
           </a:p>
@@ -1775,7 +1784,7 @@
           <a:p>
             <a:fld id="{65A75098-A21D-4A4F-97CA-F1F36A2C7EEE}" type="datetimeFigureOut">
               <a:rPr lang="en-IE" smtClean="0"/>
-              <a:t>13/09/2017</a:t>
+              <a:t>14/09/2017</a:t>
             </a:fld>
             <a:endParaRPr lang="en-IE"/>
           </a:p>
@@ -2190,7 +2199,7 @@
           <a:p>
             <a:fld id="{65A75098-A21D-4A4F-97CA-F1F36A2C7EEE}" type="datetimeFigureOut">
               <a:rPr lang="en-IE" smtClean="0"/>
-              <a:t>13/09/2017</a:t>
+              <a:t>14/09/2017</a:t>
             </a:fld>
             <a:endParaRPr lang="en-IE"/>
           </a:p>
@@ -2332,7 +2341,7 @@
           <a:p>
             <a:fld id="{65A75098-A21D-4A4F-97CA-F1F36A2C7EEE}" type="datetimeFigureOut">
               <a:rPr lang="en-IE" smtClean="0"/>
-              <a:t>13/09/2017</a:t>
+              <a:t>14/09/2017</a:t>
             </a:fld>
             <a:endParaRPr lang="en-IE"/>
           </a:p>
@@ -2445,7 +2454,7 @@
           <a:p>
             <a:fld id="{65A75098-A21D-4A4F-97CA-F1F36A2C7EEE}" type="datetimeFigureOut">
               <a:rPr lang="en-IE" smtClean="0"/>
-              <a:t>13/09/2017</a:t>
+              <a:t>14/09/2017</a:t>
             </a:fld>
             <a:endParaRPr lang="en-IE"/>
           </a:p>
@@ -2758,7 +2767,7 @@
           <a:p>
             <a:fld id="{65A75098-A21D-4A4F-97CA-F1F36A2C7EEE}" type="datetimeFigureOut">
               <a:rPr lang="en-IE" smtClean="0"/>
-              <a:t>13/09/2017</a:t>
+              <a:t>14/09/2017</a:t>
             </a:fld>
             <a:endParaRPr lang="en-IE"/>
           </a:p>
@@ -3047,7 +3056,7 @@
           <a:p>
             <a:fld id="{65A75098-A21D-4A4F-97CA-F1F36A2C7EEE}" type="datetimeFigureOut">
               <a:rPr lang="en-IE" smtClean="0"/>
-              <a:t>13/09/2017</a:t>
+              <a:t>14/09/2017</a:t>
             </a:fld>
             <a:endParaRPr lang="en-IE"/>
           </a:p>
@@ -3290,7 +3299,7 @@
           <a:p>
             <a:fld id="{65A75098-A21D-4A4F-97CA-F1F36A2C7EEE}" type="datetimeFigureOut">
               <a:rPr lang="en-IE" smtClean="0"/>
-              <a:t>13/09/2017</a:t>
+              <a:t>14/09/2017</a:t>
             </a:fld>
             <a:endParaRPr lang="en-IE"/>
           </a:p>
@@ -5417,7 +5426,15 @@
             <a:pPr algn="ctr"/>
             <a:r>
               <a:rPr lang="en-IE" sz="3200" dirty="0"/>
-              <a:t>We’re focussing around here…</a:t>
+              <a:t>We’re </a:t>
+            </a:r>
+            <a:r>
+              <a:rPr lang="en-IE" sz="3200"/>
+              <a:t>focussing here</a:t>
+            </a:r>
+            <a:r>
+              <a:rPr lang="en-IE" sz="3200" dirty="0"/>
+              <a:t>…</a:t>
             </a:r>
           </a:p>
         </p:txBody>

</xml_diff>